<commit_message>
atualização da documentação com graficos
</commit_message>
<xml_diff>
--- a/Documentacao/grafico.pptx
+++ b/Documentacao/grafico.pptx
@@ -105,7 +105,20 @@
       </a:defRPr>
     </a:lvl9pPr>
   </p:defaultTextStyle>
+  <p:extLst>
+    <p:ext uri="{EFAFB233-063F-42B5-8137-9DF3F51BA10A}">
+      <p15:sldGuideLst xmlns:p15="http://schemas.microsoft.com/office/powerpoint/2012/main"/>
+    </p:ext>
+  </p:extLst>
 </p:presentation>
+</file>
+
+<file path=ppt/revisionInfo.xml><?xml version="1.0" encoding="utf-8"?>
+<p1510:revInfo xmlns:a="http://schemas.openxmlformats.org/drawingml/2006/main" xmlns:r="http://schemas.openxmlformats.org/officeDocument/2006/relationships" xmlns:p1510="http://schemas.microsoft.com/office/powerpoint/2015/10/main">
+  <p1510:revLst>
+    <p1510:client id="{441F92C3-7447-4864-B950-8DA4D323415F}" v="1" dt="2022-09-02T23:04:36.601"/>
+  </p1510:revLst>
+</p1510:revInfo>
 </file>
 
 <file path=ppt/charts/chart1.xml><?xml version="1.0" encoding="utf-8"?>

</xml_diff>